<commit_message>
updated add project ug
</commit_message>
<xml_diff>
--- a/docs/diagrams/ui_annotated.pptx
+++ b/docs/diagrams/ui_annotated.pptx
@@ -8,6 +8,8 @@
     <p:sldId id="257" r:id="rId2"/>
     <p:sldId id="258" r:id="rId3"/>
     <p:sldId id="259" r:id="rId4"/>
+    <p:sldId id="260" r:id="rId5"/>
+    <p:sldId id="264" r:id="rId6"/>
   </p:sldIdLst>
   <p:sldSz cx="12192000" cy="6858000"/>
   <p:notesSz cx="6858000" cy="9144000"/>
@@ -106,6 +108,11 @@
       </a:defRPr>
     </a:lvl9pPr>
   </p:defaultTextStyle>
+  <p:extLst>
+    <p:ext uri="{EFAFB233-063F-42B5-8137-9DF3F51BA10A}">
+      <p15:sldGuideLst xmlns:p15="http://schemas.microsoft.com/office/powerpoint/2012/main"/>
+    </p:ext>
+  </p:extLst>
 </p:presentation>
 </file>
 
@@ -258,7 +265,7 @@
           <a:p>
             <a:fld id="{F0B7906A-B038-4706-83B2-00193F0E7D27}" type="datetimeFigureOut">
               <a:rPr lang="en-SG" smtClean="0"/>
-              <a:t>4/4/2019</a:t>
+              <a:t>11/4/2019</a:t>
             </a:fld>
             <a:endParaRPr lang="en-SG"/>
           </a:p>
@@ -458,7 +465,7 @@
           <a:p>
             <a:fld id="{F0B7906A-B038-4706-83B2-00193F0E7D27}" type="datetimeFigureOut">
               <a:rPr lang="en-SG" smtClean="0"/>
-              <a:t>4/4/2019</a:t>
+              <a:t>11/4/2019</a:t>
             </a:fld>
             <a:endParaRPr lang="en-SG"/>
           </a:p>
@@ -668,7 +675,7 @@
           <a:p>
             <a:fld id="{F0B7906A-B038-4706-83B2-00193F0E7D27}" type="datetimeFigureOut">
               <a:rPr lang="en-SG" smtClean="0"/>
-              <a:t>4/4/2019</a:t>
+              <a:t>11/4/2019</a:t>
             </a:fld>
             <a:endParaRPr lang="en-SG"/>
           </a:p>
@@ -868,7 +875,7 @@
           <a:p>
             <a:fld id="{F0B7906A-B038-4706-83B2-00193F0E7D27}" type="datetimeFigureOut">
               <a:rPr lang="en-SG" smtClean="0"/>
-              <a:t>4/4/2019</a:t>
+              <a:t>11/4/2019</a:t>
             </a:fld>
             <a:endParaRPr lang="en-SG"/>
           </a:p>
@@ -1144,7 +1151,7 @@
           <a:p>
             <a:fld id="{F0B7906A-B038-4706-83B2-00193F0E7D27}" type="datetimeFigureOut">
               <a:rPr lang="en-SG" smtClean="0"/>
-              <a:t>4/4/2019</a:t>
+              <a:t>11/4/2019</a:t>
             </a:fld>
             <a:endParaRPr lang="en-SG"/>
           </a:p>
@@ -1412,7 +1419,7 @@
           <a:p>
             <a:fld id="{F0B7906A-B038-4706-83B2-00193F0E7D27}" type="datetimeFigureOut">
               <a:rPr lang="en-SG" smtClean="0"/>
-              <a:t>4/4/2019</a:t>
+              <a:t>11/4/2019</a:t>
             </a:fld>
             <a:endParaRPr lang="en-SG"/>
           </a:p>
@@ -1827,7 +1834,7 @@
           <a:p>
             <a:fld id="{F0B7906A-B038-4706-83B2-00193F0E7D27}" type="datetimeFigureOut">
               <a:rPr lang="en-SG" smtClean="0"/>
-              <a:t>4/4/2019</a:t>
+              <a:t>11/4/2019</a:t>
             </a:fld>
             <a:endParaRPr lang="en-SG"/>
           </a:p>
@@ -1969,7 +1976,7 @@
           <a:p>
             <a:fld id="{F0B7906A-B038-4706-83B2-00193F0E7D27}" type="datetimeFigureOut">
               <a:rPr lang="en-SG" smtClean="0"/>
-              <a:t>4/4/2019</a:t>
+              <a:t>11/4/2019</a:t>
             </a:fld>
             <a:endParaRPr lang="en-SG"/>
           </a:p>
@@ -2082,7 +2089,7 @@
           <a:p>
             <a:fld id="{F0B7906A-B038-4706-83B2-00193F0E7D27}" type="datetimeFigureOut">
               <a:rPr lang="en-SG" smtClean="0"/>
-              <a:t>4/4/2019</a:t>
+              <a:t>11/4/2019</a:t>
             </a:fld>
             <a:endParaRPr lang="en-SG"/>
           </a:p>
@@ -2395,7 +2402,7 @@
           <a:p>
             <a:fld id="{F0B7906A-B038-4706-83B2-00193F0E7D27}" type="datetimeFigureOut">
               <a:rPr lang="en-SG" smtClean="0"/>
-              <a:t>4/4/2019</a:t>
+              <a:t>11/4/2019</a:t>
             </a:fld>
             <a:endParaRPr lang="en-SG"/>
           </a:p>
@@ -2684,7 +2691,7 @@
           <a:p>
             <a:fld id="{F0B7906A-B038-4706-83B2-00193F0E7D27}" type="datetimeFigureOut">
               <a:rPr lang="en-SG" smtClean="0"/>
-              <a:t>4/4/2019</a:t>
+              <a:t>11/4/2019</a:t>
             </a:fld>
             <a:endParaRPr lang="en-SG"/>
           </a:p>
@@ -2927,7 +2934,7 @@
           <a:p>
             <a:fld id="{F0B7906A-B038-4706-83B2-00193F0E7D27}" type="datetimeFigureOut">
               <a:rPr lang="en-SG" smtClean="0"/>
-              <a:t>4/4/2019</a:t>
+              <a:t>11/4/2019</a:t>
             </a:fld>
             <a:endParaRPr lang="en-SG"/>
           </a:p>
@@ -3794,7 +3801,7 @@
           <a:lstStyle/>
           <a:p>
             <a:pPr algn="ctr"/>
-            <a:endParaRPr lang="en-SG"/>
+            <a:endParaRPr lang="en-SG" dirty="0"/>
           </a:p>
         </p:txBody>
       </p:sp>
@@ -3846,7 +3853,7 @@
           <a:lstStyle/>
           <a:p>
             <a:pPr algn="ctr"/>
-            <a:endParaRPr lang="en-SG"/>
+            <a:endParaRPr lang="en-SG" dirty="0"/>
           </a:p>
         </p:txBody>
       </p:sp>
@@ -4422,6 +4429,1345 @@
     <p:extLst>
       <p:ext uri="{BB962C8B-B14F-4D97-AF65-F5344CB8AC3E}">
         <p14:creationId xmlns:p14="http://schemas.microsoft.com/office/powerpoint/2010/main" val="3621788274"/>
+      </p:ext>
+    </p:extLst>
+  </p:cSld>
+  <p:clrMapOvr>
+    <a:masterClrMapping/>
+  </p:clrMapOvr>
+</p:sld>
+</file>
+
+<file path=ppt/slides/slide4.xml><?xml version="1.0" encoding="utf-8"?>
+<p:sld xmlns:a="http://schemas.openxmlformats.org/drawingml/2006/main" xmlns:r="http://schemas.openxmlformats.org/officeDocument/2006/relationships" xmlns:p="http://schemas.openxmlformats.org/presentationml/2006/main">
+  <p:cSld>
+    <p:spTree>
+      <p:nvGrpSpPr>
+        <p:cNvPr id="1" name=""/>
+        <p:cNvGrpSpPr/>
+        <p:nvPr/>
+      </p:nvGrpSpPr>
+      <p:grpSpPr>
+        <a:xfrm>
+          <a:off x="0" y="0"/>
+          <a:ext cx="0" cy="0"/>
+          <a:chOff x="0" y="0"/>
+          <a:chExt cx="0" cy="0"/>
+        </a:xfrm>
+      </p:grpSpPr>
+      <p:pic>
+        <p:nvPicPr>
+          <p:cNvPr id="2" name="Picture 1">
+            <a:extLst>
+              <a:ext uri="{FF2B5EF4-FFF2-40B4-BE49-F238E27FC236}">
+                <a16:creationId xmlns:a16="http://schemas.microsoft.com/office/drawing/2014/main" id="{59B61738-5CA8-42EA-97E0-F79BA920BF81}"/>
+              </a:ext>
+            </a:extLst>
+          </p:cNvPr>
+          <p:cNvPicPr/>
+          <p:nvPr/>
+        </p:nvPicPr>
+        <p:blipFill rotWithShape="1">
+          <a:blip r:embed="rId2"/>
+          <a:srcRect b="4747"/>
+          <a:stretch/>
+        </p:blipFill>
+        <p:spPr bwMode="auto">
+          <a:xfrm>
+            <a:off x="0" y="0"/>
+            <a:ext cx="12192000" cy="6858000"/>
+          </a:xfrm>
+          <a:prstGeom prst="rect">
+            <a:avLst/>
+          </a:prstGeom>
+          <a:ln>
+            <a:noFill/>
+          </a:ln>
+          <a:extLst>
+            <a:ext uri="{53640926-AAD7-44D8-BBD7-CCE9431645EC}">
+              <a14:shadowObscured xmlns:a14="http://schemas.microsoft.com/office/drawing/2010/main"/>
+            </a:ext>
+          </a:extLst>
+        </p:spPr>
+      </p:pic>
+      <p:sp>
+        <p:nvSpPr>
+          <p:cNvPr id="3" name="Text Box 2">
+            <a:extLst>
+              <a:ext uri="{FF2B5EF4-FFF2-40B4-BE49-F238E27FC236}">
+                <a16:creationId xmlns:a16="http://schemas.microsoft.com/office/drawing/2014/main" id="{A8B280D1-5C4B-4530-B28D-EB2F8851644A}"/>
+              </a:ext>
+            </a:extLst>
+          </p:cNvPr>
+          <p:cNvSpPr txBox="1">
+            <a:spLocks noChangeArrowheads="1"/>
+          </p:cNvSpPr>
+          <p:nvPr/>
+        </p:nvSpPr>
+        <p:spPr bwMode="auto">
+          <a:xfrm>
+            <a:off x="8319208" y="461638"/>
+            <a:ext cx="2928799" cy="337353"/>
+          </a:xfrm>
+          <a:prstGeom prst="rect">
+            <a:avLst/>
+          </a:prstGeom>
+          <a:solidFill>
+            <a:schemeClr val="accent2"/>
+          </a:solidFill>
+          <a:ln w="9525">
+            <a:solidFill>
+              <a:srgbClr val="000000"/>
+            </a:solidFill>
+            <a:miter lim="800000"/>
+            <a:headEnd/>
+            <a:tailEnd/>
+          </a:ln>
+        </p:spPr>
+        <p:txBody>
+          <a:bodyPr rot="0" vert="horz" wrap="square" lIns="91440" tIns="45720" rIns="91440" bIns="45720" anchor="t" anchorCtr="0">
+            <a:noAutofit/>
+          </a:bodyPr>
+          <a:lstStyle/>
+          <a:p>
+            <a:pPr>
+              <a:lnSpc>
+                <a:spcPct val="107000"/>
+              </a:lnSpc>
+              <a:spcAft>
+                <a:spcPts val="800"/>
+              </a:spcAft>
+            </a:pPr>
+            <a:r>
+              <a:rPr lang="en-SG" sz="1200" b="1" dirty="0">
+                <a:solidFill>
+                  <a:schemeClr val="bg1"/>
+                </a:solidFill>
+                <a:effectLst/>
+                <a:latin typeface="Arial Nova Cond" panose="020B0506020202020204" pitchFamily="34" charset="0"/>
+                <a:ea typeface="Calibri" panose="020F0502020204030204" pitchFamily="34" charset="0"/>
+                <a:cs typeface="Times New Roman" panose="02020603050405020304" pitchFamily="18" charset="0"/>
+              </a:rPr>
+              <a:t>1. Type the command to add an employee</a:t>
+            </a:r>
+            <a:endParaRPr lang="en-SG" sz="1200" dirty="0">
+              <a:solidFill>
+                <a:schemeClr val="bg1"/>
+              </a:solidFill>
+              <a:effectLst/>
+              <a:latin typeface="Calibri" panose="020F0502020204030204" pitchFamily="34" charset="0"/>
+              <a:ea typeface="Calibri" panose="020F0502020204030204" pitchFamily="34" charset="0"/>
+              <a:cs typeface="Times New Roman" panose="02020603050405020304" pitchFamily="18" charset="0"/>
+            </a:endParaRPr>
+          </a:p>
+        </p:txBody>
+      </p:sp>
+      <p:cxnSp>
+        <p:nvCxnSpPr>
+          <p:cNvPr id="9" name="Straight Arrow Connector 8">
+            <a:extLst>
+              <a:ext uri="{FF2B5EF4-FFF2-40B4-BE49-F238E27FC236}">
+                <a16:creationId xmlns:a16="http://schemas.microsoft.com/office/drawing/2014/main" id="{7D5EF9DB-FF59-4A1C-9C92-D2F1996C5A9B}"/>
+              </a:ext>
+            </a:extLst>
+          </p:cNvPr>
+          <p:cNvCxnSpPr>
+            <a:stCxn id="3" idx="1"/>
+          </p:cNvCxnSpPr>
+          <p:nvPr/>
+        </p:nvCxnSpPr>
+        <p:spPr>
+          <a:xfrm flipH="1" flipV="1">
+            <a:off x="6178858" y="630314"/>
+            <a:ext cx="2140350" cy="1"/>
+          </a:xfrm>
+          <a:prstGeom prst="straightConnector1">
+            <a:avLst/>
+          </a:prstGeom>
+          <a:ln>
+            <a:solidFill>
+              <a:schemeClr val="accent2"/>
+            </a:solidFill>
+            <a:tailEnd type="triangle"/>
+          </a:ln>
+        </p:spPr>
+        <p:style>
+          <a:lnRef idx="1">
+            <a:schemeClr val="accent1"/>
+          </a:lnRef>
+          <a:fillRef idx="0">
+            <a:schemeClr val="accent1"/>
+          </a:fillRef>
+          <a:effectRef idx="0">
+            <a:schemeClr val="accent1"/>
+          </a:effectRef>
+          <a:fontRef idx="minor">
+            <a:schemeClr val="tx1"/>
+          </a:fontRef>
+        </p:style>
+      </p:cxnSp>
+      <p:sp>
+        <p:nvSpPr>
+          <p:cNvPr id="12" name="Text Box 2">
+            <a:extLst>
+              <a:ext uri="{FF2B5EF4-FFF2-40B4-BE49-F238E27FC236}">
+                <a16:creationId xmlns:a16="http://schemas.microsoft.com/office/drawing/2014/main" id="{06B06BFE-0C72-4775-A3BF-5CA414C1A730}"/>
+              </a:ext>
+            </a:extLst>
+          </p:cNvPr>
+          <p:cNvSpPr txBox="1">
+            <a:spLocks noChangeArrowheads="1"/>
+          </p:cNvSpPr>
+          <p:nvPr/>
+        </p:nvSpPr>
+        <p:spPr bwMode="auto">
+          <a:xfrm>
+            <a:off x="8319208" y="1145219"/>
+            <a:ext cx="2928799" cy="452763"/>
+          </a:xfrm>
+          <a:prstGeom prst="rect">
+            <a:avLst/>
+          </a:prstGeom>
+          <a:solidFill>
+            <a:schemeClr val="accent2"/>
+          </a:solidFill>
+          <a:ln w="9525">
+            <a:solidFill>
+              <a:srgbClr val="000000"/>
+            </a:solidFill>
+            <a:miter lim="800000"/>
+            <a:headEnd/>
+            <a:tailEnd/>
+          </a:ln>
+        </p:spPr>
+        <p:txBody>
+          <a:bodyPr rot="0" vert="horz" wrap="square" lIns="91440" tIns="45720" rIns="91440" bIns="45720" anchor="t" anchorCtr="0">
+            <a:noAutofit/>
+          </a:bodyPr>
+          <a:lstStyle/>
+          <a:p>
+            <a:pPr>
+              <a:lnSpc>
+                <a:spcPct val="107000"/>
+              </a:lnSpc>
+              <a:spcAft>
+                <a:spcPts val="800"/>
+              </a:spcAft>
+            </a:pPr>
+            <a:r>
+              <a:rPr lang="en-SG" sz="1200" b="1" dirty="0">
+                <a:solidFill>
+                  <a:schemeClr val="bg1"/>
+                </a:solidFill>
+                <a:latin typeface="Arial Nova Cond" panose="020B0506020202020204" pitchFamily="34" charset="0"/>
+                <a:ea typeface="Calibri" panose="020F0502020204030204" pitchFamily="34" charset="0"/>
+                <a:cs typeface="Times New Roman" panose="02020603050405020304" pitchFamily="18" charset="0"/>
+              </a:rPr>
+              <a:t>2. The details of the added employee will be indicated as a success message</a:t>
+            </a:r>
+            <a:endParaRPr lang="en-SG" sz="2000" dirty="0">
+              <a:solidFill>
+                <a:schemeClr val="bg1"/>
+              </a:solidFill>
+              <a:latin typeface="Calibri" panose="020F0502020204030204" pitchFamily="34" charset="0"/>
+              <a:ea typeface="Calibri" panose="020F0502020204030204" pitchFamily="34" charset="0"/>
+              <a:cs typeface="Times New Roman" panose="02020603050405020304" pitchFamily="18" charset="0"/>
+            </a:endParaRPr>
+          </a:p>
+        </p:txBody>
+      </p:sp>
+      <p:cxnSp>
+        <p:nvCxnSpPr>
+          <p:cNvPr id="14" name="Connector: Elbow 13">
+            <a:extLst>
+              <a:ext uri="{FF2B5EF4-FFF2-40B4-BE49-F238E27FC236}">
+                <a16:creationId xmlns:a16="http://schemas.microsoft.com/office/drawing/2014/main" id="{C4F474AB-1A54-4859-BBCA-9239987F3E79}"/>
+              </a:ext>
+            </a:extLst>
+          </p:cNvPr>
+          <p:cNvCxnSpPr>
+            <a:cxnSpLocks/>
+          </p:cNvCxnSpPr>
+          <p:nvPr/>
+        </p:nvCxnSpPr>
+        <p:spPr>
+          <a:xfrm rot="10800000">
+            <a:off x="7572652" y="1145220"/>
+            <a:ext cx="746560" cy="225767"/>
+          </a:xfrm>
+          <a:prstGeom prst="bentConnector3">
+            <a:avLst>
+              <a:gd name="adj1" fmla="val 99944"/>
+            </a:avLst>
+          </a:prstGeom>
+          <a:ln>
+            <a:solidFill>
+              <a:schemeClr val="accent2"/>
+            </a:solidFill>
+            <a:tailEnd type="triangle"/>
+          </a:ln>
+        </p:spPr>
+        <p:style>
+          <a:lnRef idx="1">
+            <a:schemeClr val="accent2"/>
+          </a:lnRef>
+          <a:fillRef idx="0">
+            <a:schemeClr val="accent2"/>
+          </a:fillRef>
+          <a:effectRef idx="0">
+            <a:schemeClr val="accent2"/>
+          </a:effectRef>
+          <a:fontRef idx="minor">
+            <a:schemeClr val="tx1"/>
+          </a:fontRef>
+        </p:style>
+      </p:cxnSp>
+      <p:sp>
+        <p:nvSpPr>
+          <p:cNvPr id="24" name="Text Box 2">
+            <a:extLst>
+              <a:ext uri="{FF2B5EF4-FFF2-40B4-BE49-F238E27FC236}">
+                <a16:creationId xmlns:a16="http://schemas.microsoft.com/office/drawing/2014/main" id="{5EFCA87F-7011-477E-9458-51DEAC349745}"/>
+              </a:ext>
+            </a:extLst>
+          </p:cNvPr>
+          <p:cNvSpPr txBox="1">
+            <a:spLocks noChangeArrowheads="1"/>
+          </p:cNvSpPr>
+          <p:nvPr/>
+        </p:nvSpPr>
+        <p:spPr bwMode="auto">
+          <a:xfrm>
+            <a:off x="2441359" y="3645025"/>
+            <a:ext cx="1351225" cy="1282082"/>
+          </a:xfrm>
+          <a:prstGeom prst="rect">
+            <a:avLst/>
+          </a:prstGeom>
+          <a:solidFill>
+            <a:schemeClr val="accent2"/>
+          </a:solidFill>
+          <a:ln w="9525">
+            <a:solidFill>
+              <a:srgbClr val="000000"/>
+            </a:solidFill>
+            <a:miter lim="800000"/>
+            <a:headEnd/>
+            <a:tailEnd/>
+          </a:ln>
+        </p:spPr>
+        <p:txBody>
+          <a:bodyPr rot="0" vert="horz" wrap="square" lIns="91440" tIns="45720" rIns="91440" bIns="45720" anchor="t" anchorCtr="0">
+            <a:noAutofit/>
+          </a:bodyPr>
+          <a:lstStyle/>
+          <a:p>
+            <a:pPr>
+              <a:lnSpc>
+                <a:spcPct val="107000"/>
+              </a:lnSpc>
+              <a:spcAft>
+                <a:spcPts val="800"/>
+              </a:spcAft>
+            </a:pPr>
+            <a:r>
+              <a:rPr lang="en-SG" sz="1200" b="1" dirty="0">
+                <a:solidFill>
+                  <a:schemeClr val="bg1"/>
+                </a:solidFill>
+                <a:effectLst/>
+                <a:latin typeface="Arial Nova Cond" panose="020B0506020202020204" pitchFamily="34" charset="0"/>
+                <a:ea typeface="Calibri" panose="020F0502020204030204" pitchFamily="34" charset="0"/>
+                <a:cs typeface="Times New Roman" panose="02020603050405020304" pitchFamily="18" charset="0"/>
+              </a:rPr>
+              <a:t>3. Panel will display the newly added employee. Clicking on it will display the employee card.</a:t>
+            </a:r>
+            <a:endParaRPr lang="en-SG" sz="1200" dirty="0">
+              <a:solidFill>
+                <a:schemeClr val="bg1"/>
+              </a:solidFill>
+              <a:effectLst/>
+              <a:latin typeface="Calibri" panose="020F0502020204030204" pitchFamily="34" charset="0"/>
+              <a:ea typeface="Calibri" panose="020F0502020204030204" pitchFamily="34" charset="0"/>
+              <a:cs typeface="Times New Roman" panose="02020603050405020304" pitchFamily="18" charset="0"/>
+            </a:endParaRPr>
+          </a:p>
+        </p:txBody>
+      </p:sp>
+      <p:sp>
+        <p:nvSpPr>
+          <p:cNvPr id="25" name="Right Brace 24">
+            <a:extLst>
+              <a:ext uri="{FF2B5EF4-FFF2-40B4-BE49-F238E27FC236}">
+                <a16:creationId xmlns:a16="http://schemas.microsoft.com/office/drawing/2014/main" id="{8118E930-36B4-4C3B-BE9F-B7F8AFA2BC5C}"/>
+              </a:ext>
+            </a:extLst>
+          </p:cNvPr>
+          <p:cNvSpPr/>
+          <p:nvPr/>
+        </p:nvSpPr>
+        <p:spPr>
+          <a:xfrm>
+            <a:off x="2148396" y="3680537"/>
+            <a:ext cx="292963" cy="1202183"/>
+          </a:xfrm>
+          <a:prstGeom prst="rightBrace">
+            <a:avLst/>
+          </a:prstGeom>
+          <a:ln>
+            <a:solidFill>
+              <a:schemeClr val="accent2"/>
+            </a:solidFill>
+          </a:ln>
+        </p:spPr>
+        <p:style>
+          <a:lnRef idx="1">
+            <a:schemeClr val="accent1"/>
+          </a:lnRef>
+          <a:fillRef idx="0">
+            <a:schemeClr val="accent1"/>
+          </a:fillRef>
+          <a:effectRef idx="0">
+            <a:schemeClr val="accent1"/>
+          </a:effectRef>
+          <a:fontRef idx="minor">
+            <a:schemeClr val="tx1"/>
+          </a:fontRef>
+        </p:style>
+        <p:txBody>
+          <a:bodyPr rtlCol="0" anchor="ctr"/>
+          <a:lstStyle/>
+          <a:p>
+            <a:pPr algn="ctr"/>
+            <a:endParaRPr lang="en-SG" dirty="0"/>
+          </a:p>
+        </p:txBody>
+      </p:sp>
+      <p:cxnSp>
+        <p:nvCxnSpPr>
+          <p:cNvPr id="27" name="Straight Arrow Connector 26">
+            <a:extLst>
+              <a:ext uri="{FF2B5EF4-FFF2-40B4-BE49-F238E27FC236}">
+                <a16:creationId xmlns:a16="http://schemas.microsoft.com/office/drawing/2014/main" id="{C2447E0D-8212-459F-AA99-705705131D78}"/>
+              </a:ext>
+            </a:extLst>
+          </p:cNvPr>
+          <p:cNvCxnSpPr/>
+          <p:nvPr/>
+        </p:nvCxnSpPr>
+        <p:spPr>
+          <a:xfrm>
+            <a:off x="3792584" y="4281628"/>
+            <a:ext cx="1471874" cy="0"/>
+          </a:xfrm>
+          <a:prstGeom prst="straightConnector1">
+            <a:avLst/>
+          </a:prstGeom>
+          <a:ln>
+            <a:solidFill>
+              <a:schemeClr val="accent2"/>
+            </a:solidFill>
+            <a:tailEnd type="triangle"/>
+          </a:ln>
+        </p:spPr>
+        <p:style>
+          <a:lnRef idx="1">
+            <a:schemeClr val="accent1"/>
+          </a:lnRef>
+          <a:fillRef idx="0">
+            <a:schemeClr val="accent1"/>
+          </a:fillRef>
+          <a:effectRef idx="0">
+            <a:schemeClr val="accent1"/>
+          </a:effectRef>
+          <a:fontRef idx="minor">
+            <a:schemeClr val="tx1"/>
+          </a:fontRef>
+        </p:style>
+      </p:cxnSp>
+      <p:sp>
+        <p:nvSpPr>
+          <p:cNvPr id="28" name="Text Box 2">
+            <a:extLst>
+              <a:ext uri="{FF2B5EF4-FFF2-40B4-BE49-F238E27FC236}">
+                <a16:creationId xmlns:a16="http://schemas.microsoft.com/office/drawing/2014/main" id="{53F11C72-F7DB-49DD-A49F-56CA03E50784}"/>
+              </a:ext>
+            </a:extLst>
+          </p:cNvPr>
+          <p:cNvSpPr txBox="1">
+            <a:spLocks noChangeArrowheads="1"/>
+          </p:cNvSpPr>
+          <p:nvPr/>
+        </p:nvSpPr>
+        <p:spPr bwMode="auto">
+          <a:xfrm>
+            <a:off x="5477523" y="5504162"/>
+            <a:ext cx="3400148" cy="519333"/>
+          </a:xfrm>
+          <a:prstGeom prst="rect">
+            <a:avLst/>
+          </a:prstGeom>
+          <a:solidFill>
+            <a:schemeClr val="accent2"/>
+          </a:solidFill>
+          <a:ln w="9525">
+            <a:solidFill>
+              <a:srgbClr val="000000"/>
+            </a:solidFill>
+            <a:miter lim="800000"/>
+            <a:headEnd/>
+            <a:tailEnd/>
+          </a:ln>
+        </p:spPr>
+        <p:txBody>
+          <a:bodyPr rot="0" vert="horz" wrap="square" lIns="91440" tIns="45720" rIns="91440" bIns="45720" anchor="t" anchorCtr="0">
+            <a:noAutofit/>
+          </a:bodyPr>
+          <a:lstStyle/>
+          <a:p>
+            <a:pPr>
+              <a:lnSpc>
+                <a:spcPct val="107000"/>
+              </a:lnSpc>
+              <a:spcAft>
+                <a:spcPts val="800"/>
+              </a:spcAft>
+            </a:pPr>
+            <a:r>
+              <a:rPr lang="en-SG" sz="1200" b="1" dirty="0">
+                <a:solidFill>
+                  <a:schemeClr val="bg1"/>
+                </a:solidFill>
+                <a:effectLst/>
+                <a:latin typeface="Arial Nova Cond" panose="020B0506020202020204" pitchFamily="34" charset="0"/>
+                <a:ea typeface="Calibri" panose="020F0502020204030204" pitchFamily="34" charset="0"/>
+                <a:cs typeface="Times New Roman" panose="02020603050405020304" pitchFamily="18" charset="0"/>
+              </a:rPr>
+              <a:t>4. The employee card which contains key details of the employee.</a:t>
+            </a:r>
+            <a:endParaRPr lang="en-SG" sz="1200" dirty="0">
+              <a:solidFill>
+                <a:schemeClr val="bg1"/>
+              </a:solidFill>
+              <a:effectLst/>
+              <a:latin typeface="Calibri" panose="020F0502020204030204" pitchFamily="34" charset="0"/>
+              <a:ea typeface="Calibri" panose="020F0502020204030204" pitchFamily="34" charset="0"/>
+              <a:cs typeface="Times New Roman" panose="02020603050405020304" pitchFamily="18" charset="0"/>
+            </a:endParaRPr>
+          </a:p>
+        </p:txBody>
+      </p:sp>
+      <p:sp>
+        <p:nvSpPr>
+          <p:cNvPr id="29" name="Text Box 2">
+            <a:extLst>
+              <a:ext uri="{FF2B5EF4-FFF2-40B4-BE49-F238E27FC236}">
+                <a16:creationId xmlns:a16="http://schemas.microsoft.com/office/drawing/2014/main" id="{7D89CDAA-BA33-4FE8-9ECB-247CA188E386}"/>
+              </a:ext>
+            </a:extLst>
+          </p:cNvPr>
+          <p:cNvSpPr txBox="1">
+            <a:spLocks noChangeArrowheads="1"/>
+          </p:cNvSpPr>
+          <p:nvPr/>
+        </p:nvSpPr>
+        <p:spPr bwMode="auto">
+          <a:xfrm>
+            <a:off x="9750641" y="4741418"/>
+            <a:ext cx="1498295" cy="1282077"/>
+          </a:xfrm>
+          <a:prstGeom prst="rect">
+            <a:avLst/>
+          </a:prstGeom>
+          <a:solidFill>
+            <a:schemeClr val="accent2"/>
+          </a:solidFill>
+          <a:ln w="9525">
+            <a:solidFill>
+              <a:srgbClr val="000000"/>
+            </a:solidFill>
+            <a:miter lim="800000"/>
+            <a:headEnd/>
+            <a:tailEnd/>
+          </a:ln>
+        </p:spPr>
+        <p:txBody>
+          <a:bodyPr rot="0" vert="horz" wrap="square" lIns="91440" tIns="45720" rIns="91440" bIns="45720" anchor="t" anchorCtr="0">
+            <a:noAutofit/>
+          </a:bodyPr>
+          <a:lstStyle/>
+          <a:p>
+            <a:pPr>
+              <a:lnSpc>
+                <a:spcPct val="107000"/>
+              </a:lnSpc>
+              <a:spcAft>
+                <a:spcPts val="800"/>
+              </a:spcAft>
+            </a:pPr>
+            <a:r>
+              <a:rPr lang="en-SG" sz="1200" b="1" dirty="0">
+                <a:solidFill>
+                  <a:schemeClr val="bg1"/>
+                </a:solidFill>
+                <a:effectLst/>
+                <a:latin typeface="Arial Nova Cond" panose="020B0506020202020204" pitchFamily="34" charset="0"/>
+                <a:ea typeface="Calibri" panose="020F0502020204030204" pitchFamily="34" charset="0"/>
+                <a:cs typeface="Times New Roman" panose="02020603050405020304" pitchFamily="18" charset="0"/>
+              </a:rPr>
+              <a:t>5. Toggling the arrow leads to a loaded GitHub page of the employee based on his GitHub account username.</a:t>
+            </a:r>
+            <a:endParaRPr lang="en-SG" sz="1200" dirty="0">
+              <a:solidFill>
+                <a:schemeClr val="bg1"/>
+              </a:solidFill>
+              <a:effectLst/>
+              <a:latin typeface="Calibri" panose="020F0502020204030204" pitchFamily="34" charset="0"/>
+              <a:ea typeface="Calibri" panose="020F0502020204030204" pitchFamily="34" charset="0"/>
+              <a:cs typeface="Times New Roman" panose="02020603050405020304" pitchFamily="18" charset="0"/>
+            </a:endParaRPr>
+          </a:p>
+        </p:txBody>
+      </p:sp>
+      <p:cxnSp>
+        <p:nvCxnSpPr>
+          <p:cNvPr id="33" name="Connector: Elbow 32">
+            <a:extLst>
+              <a:ext uri="{FF2B5EF4-FFF2-40B4-BE49-F238E27FC236}">
+                <a16:creationId xmlns:a16="http://schemas.microsoft.com/office/drawing/2014/main" id="{7A00DE62-8107-4B73-A572-9B4B35B0544F}"/>
+              </a:ext>
+            </a:extLst>
+          </p:cNvPr>
+          <p:cNvCxnSpPr>
+            <a:stCxn id="29" idx="0"/>
+          </p:cNvCxnSpPr>
+          <p:nvPr/>
+        </p:nvCxnSpPr>
+        <p:spPr>
+          <a:xfrm rot="5400000" flipH="1" flipV="1">
+            <a:off x="10664902" y="4034025"/>
+            <a:ext cx="542280" cy="872506"/>
+          </a:xfrm>
+          <a:prstGeom prst="bentConnector2">
+            <a:avLst/>
+          </a:prstGeom>
+          <a:ln>
+            <a:solidFill>
+              <a:schemeClr val="accent2"/>
+            </a:solidFill>
+            <a:tailEnd type="triangle"/>
+          </a:ln>
+        </p:spPr>
+        <p:style>
+          <a:lnRef idx="1">
+            <a:schemeClr val="accent1"/>
+          </a:lnRef>
+          <a:fillRef idx="0">
+            <a:schemeClr val="accent1"/>
+          </a:fillRef>
+          <a:effectRef idx="0">
+            <a:schemeClr val="accent1"/>
+          </a:effectRef>
+          <a:fontRef idx="minor">
+            <a:schemeClr val="tx1"/>
+          </a:fontRef>
+        </p:style>
+      </p:cxnSp>
+    </p:spTree>
+    <p:extLst>
+      <p:ext uri="{BB962C8B-B14F-4D97-AF65-F5344CB8AC3E}">
+        <p14:creationId xmlns:p14="http://schemas.microsoft.com/office/powerpoint/2010/main" val="2312534276"/>
+      </p:ext>
+    </p:extLst>
+  </p:cSld>
+  <p:clrMapOvr>
+    <a:masterClrMapping/>
+  </p:clrMapOvr>
+</p:sld>
+</file>
+
+<file path=ppt/slides/slide5.xml><?xml version="1.0" encoding="utf-8"?>
+<p:sld xmlns:a="http://schemas.openxmlformats.org/drawingml/2006/main" xmlns:r="http://schemas.openxmlformats.org/officeDocument/2006/relationships" xmlns:p="http://schemas.openxmlformats.org/presentationml/2006/main">
+  <p:cSld>
+    <p:spTree>
+      <p:nvGrpSpPr>
+        <p:cNvPr id="1" name=""/>
+        <p:cNvGrpSpPr/>
+        <p:nvPr/>
+      </p:nvGrpSpPr>
+      <p:grpSpPr>
+        <a:xfrm>
+          <a:off x="0" y="0"/>
+          <a:ext cx="0" cy="0"/>
+          <a:chOff x="0" y="0"/>
+          <a:chExt cx="0" cy="0"/>
+        </a:xfrm>
+      </p:grpSpPr>
+      <p:pic>
+        <p:nvPicPr>
+          <p:cNvPr id="2" name="Picture 1">
+            <a:extLst>
+              <a:ext uri="{FF2B5EF4-FFF2-40B4-BE49-F238E27FC236}">
+                <a16:creationId xmlns:a16="http://schemas.microsoft.com/office/drawing/2014/main" id="{635C4910-D849-43CB-848D-D6CE9A628B28}"/>
+              </a:ext>
+            </a:extLst>
+          </p:cNvPr>
+          <p:cNvPicPr>
+            <a:picLocks noChangeAspect="1"/>
+          </p:cNvPicPr>
+          <p:nvPr/>
+        </p:nvPicPr>
+        <p:blipFill rotWithShape="1">
+          <a:blip r:embed="rId2"/>
+          <a:srcRect b="4722"/>
+          <a:stretch/>
+        </p:blipFill>
+        <p:spPr>
+          <a:xfrm>
+            <a:off x="0" y="0"/>
+            <a:ext cx="12192000" cy="6858000"/>
+          </a:xfrm>
+          <a:prstGeom prst="rect">
+            <a:avLst/>
+          </a:prstGeom>
+        </p:spPr>
+      </p:pic>
+      <p:sp>
+        <p:nvSpPr>
+          <p:cNvPr id="3" name="Text Box 2">
+            <a:extLst>
+              <a:ext uri="{FF2B5EF4-FFF2-40B4-BE49-F238E27FC236}">
+                <a16:creationId xmlns:a16="http://schemas.microsoft.com/office/drawing/2014/main" id="{2E5D2E44-2D75-4C7B-A5DB-3DCD58BDCF84}"/>
+              </a:ext>
+            </a:extLst>
+          </p:cNvPr>
+          <p:cNvSpPr txBox="1">
+            <a:spLocks noChangeArrowheads="1"/>
+          </p:cNvSpPr>
+          <p:nvPr/>
+        </p:nvSpPr>
+        <p:spPr bwMode="auto">
+          <a:xfrm>
+            <a:off x="8324479" y="461637"/>
+            <a:ext cx="2928799" cy="337353"/>
+          </a:xfrm>
+          <a:prstGeom prst="rect">
+            <a:avLst/>
+          </a:prstGeom>
+          <a:solidFill>
+            <a:schemeClr val="accent2"/>
+          </a:solidFill>
+          <a:ln w="9525">
+            <a:solidFill>
+              <a:srgbClr val="000000"/>
+            </a:solidFill>
+            <a:miter lim="800000"/>
+            <a:headEnd/>
+            <a:tailEnd/>
+          </a:ln>
+        </p:spPr>
+        <p:txBody>
+          <a:bodyPr rot="0" vert="horz" wrap="square" lIns="91440" tIns="45720" rIns="91440" bIns="45720" anchor="t" anchorCtr="0">
+            <a:noAutofit/>
+          </a:bodyPr>
+          <a:lstStyle/>
+          <a:p>
+            <a:pPr>
+              <a:lnSpc>
+                <a:spcPct val="107000"/>
+              </a:lnSpc>
+              <a:spcAft>
+                <a:spcPts val="800"/>
+              </a:spcAft>
+            </a:pPr>
+            <a:r>
+              <a:rPr lang="en-SG" sz="1200" b="1" dirty="0">
+                <a:solidFill>
+                  <a:schemeClr val="bg1"/>
+                </a:solidFill>
+                <a:effectLst/>
+                <a:latin typeface="Arial Nova Cond" panose="020B0506020202020204" pitchFamily="34" charset="0"/>
+                <a:ea typeface="Calibri" panose="020F0502020204030204" pitchFamily="34" charset="0"/>
+                <a:cs typeface="Times New Roman" panose="02020603050405020304" pitchFamily="18" charset="0"/>
+              </a:rPr>
+              <a:t>1. Type the command to add a project</a:t>
+            </a:r>
+            <a:endParaRPr lang="en-SG" sz="1200" dirty="0">
+              <a:solidFill>
+                <a:schemeClr val="bg1"/>
+              </a:solidFill>
+              <a:effectLst/>
+              <a:latin typeface="Calibri" panose="020F0502020204030204" pitchFamily="34" charset="0"/>
+              <a:ea typeface="Calibri" panose="020F0502020204030204" pitchFamily="34" charset="0"/>
+              <a:cs typeface="Times New Roman" panose="02020603050405020304" pitchFamily="18" charset="0"/>
+            </a:endParaRPr>
+          </a:p>
+        </p:txBody>
+      </p:sp>
+      <p:cxnSp>
+        <p:nvCxnSpPr>
+          <p:cNvPr id="5" name="Straight Arrow Connector 4">
+            <a:extLst>
+              <a:ext uri="{FF2B5EF4-FFF2-40B4-BE49-F238E27FC236}">
+                <a16:creationId xmlns:a16="http://schemas.microsoft.com/office/drawing/2014/main" id="{1AB3D446-4316-4808-80C8-AE9B35F8FFA5}"/>
+              </a:ext>
+            </a:extLst>
+          </p:cNvPr>
+          <p:cNvCxnSpPr>
+            <a:cxnSpLocks/>
+            <a:stCxn id="3" idx="1"/>
+          </p:cNvCxnSpPr>
+          <p:nvPr/>
+        </p:nvCxnSpPr>
+        <p:spPr>
+          <a:xfrm flipH="1">
+            <a:off x="4724401" y="630314"/>
+            <a:ext cx="3600078" cy="1"/>
+          </a:xfrm>
+          <a:prstGeom prst="straightConnector1">
+            <a:avLst/>
+          </a:prstGeom>
+          <a:ln>
+            <a:solidFill>
+              <a:schemeClr val="accent2"/>
+            </a:solidFill>
+            <a:tailEnd type="triangle"/>
+          </a:ln>
+        </p:spPr>
+        <p:style>
+          <a:lnRef idx="1">
+            <a:schemeClr val="accent1"/>
+          </a:lnRef>
+          <a:fillRef idx="0">
+            <a:schemeClr val="accent1"/>
+          </a:fillRef>
+          <a:effectRef idx="0">
+            <a:schemeClr val="accent1"/>
+          </a:effectRef>
+          <a:fontRef idx="minor">
+            <a:schemeClr val="tx1"/>
+          </a:fontRef>
+        </p:style>
+      </p:cxnSp>
+      <p:sp>
+        <p:nvSpPr>
+          <p:cNvPr id="7" name="Text Box 2">
+            <a:extLst>
+              <a:ext uri="{FF2B5EF4-FFF2-40B4-BE49-F238E27FC236}">
+                <a16:creationId xmlns:a16="http://schemas.microsoft.com/office/drawing/2014/main" id="{C6AF9B88-6406-4897-A86F-431A12A3A878}"/>
+              </a:ext>
+            </a:extLst>
+          </p:cNvPr>
+          <p:cNvSpPr txBox="1">
+            <a:spLocks noChangeArrowheads="1"/>
+          </p:cNvSpPr>
+          <p:nvPr/>
+        </p:nvSpPr>
+        <p:spPr bwMode="auto">
+          <a:xfrm>
+            <a:off x="8324478" y="976541"/>
+            <a:ext cx="2928799" cy="452763"/>
+          </a:xfrm>
+          <a:prstGeom prst="rect">
+            <a:avLst/>
+          </a:prstGeom>
+          <a:solidFill>
+            <a:schemeClr val="accent2"/>
+          </a:solidFill>
+          <a:ln w="9525">
+            <a:solidFill>
+              <a:srgbClr val="000000"/>
+            </a:solidFill>
+            <a:miter lim="800000"/>
+            <a:headEnd/>
+            <a:tailEnd/>
+          </a:ln>
+        </p:spPr>
+        <p:txBody>
+          <a:bodyPr rot="0" vert="horz" wrap="square" lIns="91440" tIns="45720" rIns="91440" bIns="45720" anchor="t" anchorCtr="0">
+            <a:noAutofit/>
+          </a:bodyPr>
+          <a:lstStyle/>
+          <a:p>
+            <a:pPr>
+              <a:lnSpc>
+                <a:spcPct val="107000"/>
+              </a:lnSpc>
+              <a:spcAft>
+                <a:spcPts val="800"/>
+              </a:spcAft>
+            </a:pPr>
+            <a:r>
+              <a:rPr lang="en-SG" sz="1200" b="1" dirty="0">
+                <a:solidFill>
+                  <a:schemeClr val="bg1"/>
+                </a:solidFill>
+                <a:latin typeface="Arial Nova Cond" panose="020B0506020202020204" pitchFamily="34" charset="0"/>
+                <a:ea typeface="Calibri" panose="020F0502020204030204" pitchFamily="34" charset="0"/>
+                <a:cs typeface="Times New Roman" panose="02020603050405020304" pitchFamily="18" charset="0"/>
+              </a:rPr>
+              <a:t>2. The details of the added project will be indicated as a success message.</a:t>
+            </a:r>
+            <a:endParaRPr lang="en-SG" sz="2000" dirty="0">
+              <a:solidFill>
+                <a:schemeClr val="bg1"/>
+              </a:solidFill>
+              <a:latin typeface="Calibri" panose="020F0502020204030204" pitchFamily="34" charset="0"/>
+              <a:ea typeface="Calibri" panose="020F0502020204030204" pitchFamily="34" charset="0"/>
+              <a:cs typeface="Times New Roman" panose="02020603050405020304" pitchFamily="18" charset="0"/>
+            </a:endParaRPr>
+          </a:p>
+        </p:txBody>
+      </p:sp>
+      <p:cxnSp>
+        <p:nvCxnSpPr>
+          <p:cNvPr id="13" name="Straight Arrow Connector 12">
+            <a:extLst>
+              <a:ext uri="{FF2B5EF4-FFF2-40B4-BE49-F238E27FC236}">
+                <a16:creationId xmlns:a16="http://schemas.microsoft.com/office/drawing/2014/main" id="{0F1D0CA1-7643-4296-83F8-493E686EFB89}"/>
+              </a:ext>
+            </a:extLst>
+          </p:cNvPr>
+          <p:cNvCxnSpPr>
+            <a:cxnSpLocks/>
+          </p:cNvCxnSpPr>
+          <p:nvPr/>
+        </p:nvCxnSpPr>
+        <p:spPr>
+          <a:xfrm flipH="1">
+            <a:off x="6889072" y="1211799"/>
+            <a:ext cx="1561174" cy="0"/>
+          </a:xfrm>
+          <a:prstGeom prst="straightConnector1">
+            <a:avLst/>
+          </a:prstGeom>
+          <a:ln>
+            <a:solidFill>
+              <a:schemeClr val="accent2"/>
+            </a:solidFill>
+            <a:tailEnd type="triangle"/>
+          </a:ln>
+        </p:spPr>
+        <p:style>
+          <a:lnRef idx="1">
+            <a:schemeClr val="accent1"/>
+          </a:lnRef>
+          <a:fillRef idx="0">
+            <a:schemeClr val="accent1"/>
+          </a:fillRef>
+          <a:effectRef idx="0">
+            <a:schemeClr val="accent1"/>
+          </a:effectRef>
+          <a:fontRef idx="minor">
+            <a:schemeClr val="tx1"/>
+          </a:fontRef>
+        </p:style>
+      </p:cxnSp>
+      <p:sp>
+        <p:nvSpPr>
+          <p:cNvPr id="15" name="Right Brace 14">
+            <a:extLst>
+              <a:ext uri="{FF2B5EF4-FFF2-40B4-BE49-F238E27FC236}">
+                <a16:creationId xmlns:a16="http://schemas.microsoft.com/office/drawing/2014/main" id="{8A63CBB2-E745-4E00-A745-D9F58472E727}"/>
+              </a:ext>
+            </a:extLst>
+          </p:cNvPr>
+          <p:cNvSpPr/>
+          <p:nvPr/>
+        </p:nvSpPr>
+        <p:spPr>
+          <a:xfrm>
+            <a:off x="2148396" y="3574001"/>
+            <a:ext cx="292963" cy="1104531"/>
+          </a:xfrm>
+          <a:prstGeom prst="rightBrace">
+            <a:avLst/>
+          </a:prstGeom>
+          <a:ln>
+            <a:solidFill>
+              <a:schemeClr val="accent2"/>
+            </a:solidFill>
+          </a:ln>
+        </p:spPr>
+        <p:style>
+          <a:lnRef idx="1">
+            <a:schemeClr val="accent1"/>
+          </a:lnRef>
+          <a:fillRef idx="0">
+            <a:schemeClr val="accent1"/>
+          </a:fillRef>
+          <a:effectRef idx="0">
+            <a:schemeClr val="accent1"/>
+          </a:effectRef>
+          <a:fontRef idx="minor">
+            <a:schemeClr val="tx1"/>
+          </a:fontRef>
+        </p:style>
+        <p:txBody>
+          <a:bodyPr rtlCol="0" anchor="ctr"/>
+          <a:lstStyle/>
+          <a:p>
+            <a:pPr algn="ctr"/>
+            <a:endParaRPr lang="en-SG" dirty="0"/>
+          </a:p>
+        </p:txBody>
+      </p:sp>
+      <p:sp>
+        <p:nvSpPr>
+          <p:cNvPr id="16" name="Text Box 2">
+            <a:extLst>
+              <a:ext uri="{FF2B5EF4-FFF2-40B4-BE49-F238E27FC236}">
+                <a16:creationId xmlns:a16="http://schemas.microsoft.com/office/drawing/2014/main" id="{C588A42A-DB81-4566-BA44-A713DDE2D716}"/>
+              </a:ext>
+            </a:extLst>
+          </p:cNvPr>
+          <p:cNvSpPr txBox="1">
+            <a:spLocks noChangeArrowheads="1"/>
+          </p:cNvSpPr>
+          <p:nvPr/>
+        </p:nvSpPr>
+        <p:spPr bwMode="auto">
+          <a:xfrm>
+            <a:off x="2441359" y="3485225"/>
+            <a:ext cx="1351225" cy="1282082"/>
+          </a:xfrm>
+          <a:prstGeom prst="rect">
+            <a:avLst/>
+          </a:prstGeom>
+          <a:solidFill>
+            <a:schemeClr val="accent2"/>
+          </a:solidFill>
+          <a:ln w="9525">
+            <a:solidFill>
+              <a:srgbClr val="000000"/>
+            </a:solidFill>
+            <a:miter lim="800000"/>
+            <a:headEnd/>
+            <a:tailEnd/>
+          </a:ln>
+        </p:spPr>
+        <p:txBody>
+          <a:bodyPr rot="0" vert="horz" wrap="square" lIns="91440" tIns="45720" rIns="91440" bIns="45720" anchor="t" anchorCtr="0">
+            <a:noAutofit/>
+          </a:bodyPr>
+          <a:lstStyle/>
+          <a:p>
+            <a:pPr>
+              <a:lnSpc>
+                <a:spcPct val="107000"/>
+              </a:lnSpc>
+              <a:spcAft>
+                <a:spcPts val="800"/>
+              </a:spcAft>
+            </a:pPr>
+            <a:r>
+              <a:rPr lang="en-SG" sz="1200" b="1" dirty="0">
+                <a:solidFill>
+                  <a:schemeClr val="bg1"/>
+                </a:solidFill>
+                <a:effectLst/>
+                <a:latin typeface="Arial Nova Cond" panose="020B0506020202020204" pitchFamily="34" charset="0"/>
+                <a:ea typeface="Calibri" panose="020F0502020204030204" pitchFamily="34" charset="0"/>
+                <a:cs typeface="Times New Roman" panose="02020603050405020304" pitchFamily="18" charset="0"/>
+              </a:rPr>
+              <a:t>3. Panel will display the newly added project. Clicking on it will display the project card.</a:t>
+            </a:r>
+            <a:endParaRPr lang="en-SG" sz="1200" dirty="0">
+              <a:solidFill>
+                <a:schemeClr val="bg1"/>
+              </a:solidFill>
+              <a:effectLst/>
+              <a:latin typeface="Calibri" panose="020F0502020204030204" pitchFamily="34" charset="0"/>
+              <a:ea typeface="Calibri" panose="020F0502020204030204" pitchFamily="34" charset="0"/>
+              <a:cs typeface="Times New Roman" panose="02020603050405020304" pitchFamily="18" charset="0"/>
+            </a:endParaRPr>
+          </a:p>
+        </p:txBody>
+      </p:sp>
+      <p:cxnSp>
+        <p:nvCxnSpPr>
+          <p:cNvPr id="17" name="Straight Arrow Connector 16">
+            <a:extLst>
+              <a:ext uri="{FF2B5EF4-FFF2-40B4-BE49-F238E27FC236}">
+                <a16:creationId xmlns:a16="http://schemas.microsoft.com/office/drawing/2014/main" id="{3DEAB8B1-49CA-4625-BF07-E338095951D1}"/>
+              </a:ext>
+            </a:extLst>
+          </p:cNvPr>
+          <p:cNvCxnSpPr>
+            <a:cxnSpLocks/>
+          </p:cNvCxnSpPr>
+          <p:nvPr/>
+        </p:nvCxnSpPr>
+        <p:spPr>
+          <a:xfrm>
+            <a:off x="3792584" y="4121829"/>
+            <a:ext cx="1631672" cy="0"/>
+          </a:xfrm>
+          <a:prstGeom prst="straightConnector1">
+            <a:avLst/>
+          </a:prstGeom>
+          <a:ln>
+            <a:solidFill>
+              <a:schemeClr val="accent2"/>
+            </a:solidFill>
+            <a:tailEnd type="triangle"/>
+          </a:ln>
+        </p:spPr>
+        <p:style>
+          <a:lnRef idx="1">
+            <a:schemeClr val="accent1"/>
+          </a:lnRef>
+          <a:fillRef idx="0">
+            <a:schemeClr val="accent1"/>
+          </a:fillRef>
+          <a:effectRef idx="0">
+            <a:schemeClr val="accent1"/>
+          </a:effectRef>
+          <a:fontRef idx="minor">
+            <a:schemeClr val="tx1"/>
+          </a:fontRef>
+        </p:style>
+      </p:cxnSp>
+      <p:sp>
+        <p:nvSpPr>
+          <p:cNvPr id="19" name="Text Box 2">
+            <a:extLst>
+              <a:ext uri="{FF2B5EF4-FFF2-40B4-BE49-F238E27FC236}">
+                <a16:creationId xmlns:a16="http://schemas.microsoft.com/office/drawing/2014/main" id="{6AEE2983-29BE-4830-BB29-E21317E73D4E}"/>
+              </a:ext>
+            </a:extLst>
+          </p:cNvPr>
+          <p:cNvSpPr txBox="1">
+            <a:spLocks noChangeArrowheads="1"/>
+          </p:cNvSpPr>
+          <p:nvPr/>
+        </p:nvSpPr>
+        <p:spPr bwMode="auto">
+          <a:xfrm>
+            <a:off x="5477523" y="5513040"/>
+            <a:ext cx="3400148" cy="519333"/>
+          </a:xfrm>
+          <a:prstGeom prst="rect">
+            <a:avLst/>
+          </a:prstGeom>
+          <a:solidFill>
+            <a:schemeClr val="accent2"/>
+          </a:solidFill>
+          <a:ln w="9525">
+            <a:solidFill>
+              <a:srgbClr val="000000"/>
+            </a:solidFill>
+            <a:miter lim="800000"/>
+            <a:headEnd/>
+            <a:tailEnd/>
+          </a:ln>
+        </p:spPr>
+        <p:txBody>
+          <a:bodyPr rot="0" vert="horz" wrap="square" lIns="91440" tIns="45720" rIns="91440" bIns="45720" anchor="t" anchorCtr="0">
+            <a:noAutofit/>
+          </a:bodyPr>
+          <a:lstStyle/>
+          <a:p>
+            <a:pPr>
+              <a:lnSpc>
+                <a:spcPct val="107000"/>
+              </a:lnSpc>
+              <a:spcAft>
+                <a:spcPts val="800"/>
+              </a:spcAft>
+            </a:pPr>
+            <a:r>
+              <a:rPr lang="en-SG" sz="1200" b="1" dirty="0">
+                <a:solidFill>
+                  <a:schemeClr val="bg1"/>
+                </a:solidFill>
+                <a:effectLst/>
+                <a:latin typeface="Arial Nova Cond" panose="020B0506020202020204" pitchFamily="34" charset="0"/>
+                <a:ea typeface="Calibri" panose="020F0502020204030204" pitchFamily="34" charset="0"/>
+                <a:cs typeface="Times New Roman" panose="02020603050405020304" pitchFamily="18" charset="0"/>
+              </a:rPr>
+              <a:t>4. The project card which contains key initial details of the project.</a:t>
+            </a:r>
+            <a:endParaRPr lang="en-SG" sz="1200" dirty="0">
+              <a:solidFill>
+                <a:schemeClr val="bg1"/>
+              </a:solidFill>
+              <a:effectLst/>
+              <a:latin typeface="Calibri" panose="020F0502020204030204" pitchFamily="34" charset="0"/>
+              <a:ea typeface="Calibri" panose="020F0502020204030204" pitchFamily="34" charset="0"/>
+              <a:cs typeface="Times New Roman" panose="02020603050405020304" pitchFamily="18" charset="0"/>
+            </a:endParaRPr>
+          </a:p>
+        </p:txBody>
+      </p:sp>
+      <p:sp>
+        <p:nvSpPr>
+          <p:cNvPr id="21" name="TextBox 20">
+            <a:extLst>
+              <a:ext uri="{FF2B5EF4-FFF2-40B4-BE49-F238E27FC236}">
+                <a16:creationId xmlns:a16="http://schemas.microsoft.com/office/drawing/2014/main" id="{18EE55AF-F077-4867-B380-0675BC328F9B}"/>
+              </a:ext>
+            </a:extLst>
+          </p:cNvPr>
+          <p:cNvSpPr txBox="1"/>
+          <p:nvPr/>
+        </p:nvSpPr>
+        <p:spPr>
+          <a:xfrm>
+            <a:off x="5628443" y="3045041"/>
+            <a:ext cx="3080551" cy="519308"/>
+          </a:xfrm>
+          <a:prstGeom prst="rect">
+            <a:avLst/>
+          </a:prstGeom>
+          <a:noFill/>
+          <a:ln w="57150">
+            <a:solidFill>
+              <a:schemeClr val="accent2"/>
+            </a:solidFill>
+          </a:ln>
+        </p:spPr>
+        <p:txBody>
+          <a:bodyPr wrap="square" rtlCol="0">
+            <a:spAutoFit/>
+          </a:bodyPr>
+          <a:lstStyle/>
+          <a:p>
+            <a:endParaRPr lang="en-SG" dirty="0"/>
+          </a:p>
+        </p:txBody>
+      </p:sp>
+      <p:sp>
+        <p:nvSpPr>
+          <p:cNvPr id="22" name="Text Box 2">
+            <a:extLst>
+              <a:ext uri="{FF2B5EF4-FFF2-40B4-BE49-F238E27FC236}">
+                <a16:creationId xmlns:a16="http://schemas.microsoft.com/office/drawing/2014/main" id="{4C0D30C6-DC8B-42D0-9BF4-E266D34F3539}"/>
+              </a:ext>
+            </a:extLst>
+          </p:cNvPr>
+          <p:cNvSpPr txBox="1">
+            <a:spLocks noChangeArrowheads="1"/>
+          </p:cNvSpPr>
+          <p:nvPr/>
+        </p:nvSpPr>
+        <p:spPr bwMode="auto">
+          <a:xfrm>
+            <a:off x="9687017" y="2649613"/>
+            <a:ext cx="1566260" cy="1282082"/>
+          </a:xfrm>
+          <a:prstGeom prst="rect">
+            <a:avLst/>
+          </a:prstGeom>
+          <a:solidFill>
+            <a:schemeClr val="accent2"/>
+          </a:solidFill>
+          <a:ln w="9525">
+            <a:solidFill>
+              <a:srgbClr val="000000"/>
+            </a:solidFill>
+            <a:miter lim="800000"/>
+            <a:headEnd/>
+            <a:tailEnd/>
+          </a:ln>
+        </p:spPr>
+        <p:txBody>
+          <a:bodyPr rot="0" vert="horz" wrap="square" lIns="91440" tIns="45720" rIns="91440" bIns="45720" anchor="t" anchorCtr="0">
+            <a:noAutofit/>
+          </a:bodyPr>
+          <a:lstStyle/>
+          <a:p>
+            <a:pPr>
+              <a:lnSpc>
+                <a:spcPct val="107000"/>
+              </a:lnSpc>
+              <a:spcAft>
+                <a:spcPts val="800"/>
+              </a:spcAft>
+            </a:pPr>
+            <a:r>
+              <a:rPr lang="en-SG" sz="1200" b="1" dirty="0">
+                <a:solidFill>
+                  <a:schemeClr val="bg1"/>
+                </a:solidFill>
+                <a:latin typeface="Arial Nova Cond" panose="020B0506020202020204" pitchFamily="34" charset="0"/>
+                <a:ea typeface="Calibri" panose="020F0502020204030204" pitchFamily="34" charset="0"/>
+                <a:cs typeface="Times New Roman" panose="02020603050405020304" pitchFamily="18" charset="0"/>
+              </a:rPr>
+              <a:t>5</a:t>
+            </a:r>
+            <a:r>
+              <a:rPr lang="en-SG" sz="1200" b="1" dirty="0">
+                <a:solidFill>
+                  <a:schemeClr val="bg1"/>
+                </a:solidFill>
+                <a:effectLst/>
+                <a:latin typeface="Arial Nova Cond" panose="020B0506020202020204" pitchFamily="34" charset="0"/>
+                <a:ea typeface="Calibri" panose="020F0502020204030204" pitchFamily="34" charset="0"/>
+                <a:cs typeface="Times New Roman" panose="02020603050405020304" pitchFamily="18" charset="0"/>
+              </a:rPr>
+              <a:t>. The project is created with a default description. The description has to be edited using the edit project command</a:t>
+            </a:r>
+            <a:endParaRPr lang="en-SG" sz="1200" dirty="0">
+              <a:solidFill>
+                <a:schemeClr val="bg1"/>
+              </a:solidFill>
+              <a:effectLst/>
+              <a:latin typeface="Calibri" panose="020F0502020204030204" pitchFamily="34" charset="0"/>
+              <a:ea typeface="Calibri" panose="020F0502020204030204" pitchFamily="34" charset="0"/>
+              <a:cs typeface="Times New Roman" panose="02020603050405020304" pitchFamily="18" charset="0"/>
+            </a:endParaRPr>
+          </a:p>
+        </p:txBody>
+      </p:sp>
+      <p:cxnSp>
+        <p:nvCxnSpPr>
+          <p:cNvPr id="23" name="Straight Arrow Connector 22">
+            <a:extLst>
+              <a:ext uri="{FF2B5EF4-FFF2-40B4-BE49-F238E27FC236}">
+                <a16:creationId xmlns:a16="http://schemas.microsoft.com/office/drawing/2014/main" id="{7F438014-65E3-406D-B9AD-48D998496138}"/>
+              </a:ext>
+            </a:extLst>
+          </p:cNvPr>
+          <p:cNvCxnSpPr>
+            <a:cxnSpLocks/>
+          </p:cNvCxnSpPr>
+          <p:nvPr/>
+        </p:nvCxnSpPr>
+        <p:spPr>
+          <a:xfrm flipH="1">
+            <a:off x="8748294" y="3290654"/>
+            <a:ext cx="938724" cy="0"/>
+          </a:xfrm>
+          <a:prstGeom prst="straightConnector1">
+            <a:avLst/>
+          </a:prstGeom>
+          <a:ln>
+            <a:solidFill>
+              <a:schemeClr val="accent2"/>
+            </a:solidFill>
+            <a:tailEnd type="triangle"/>
+          </a:ln>
+        </p:spPr>
+        <p:style>
+          <a:lnRef idx="1">
+            <a:schemeClr val="accent1"/>
+          </a:lnRef>
+          <a:fillRef idx="0">
+            <a:schemeClr val="accent1"/>
+          </a:fillRef>
+          <a:effectRef idx="0">
+            <a:schemeClr val="accent1"/>
+          </a:effectRef>
+          <a:fontRef idx="minor">
+            <a:schemeClr val="tx1"/>
+          </a:fontRef>
+        </p:style>
+      </p:cxnSp>
+    </p:spTree>
+    <p:extLst>
+      <p:ext uri="{BB962C8B-B14F-4D97-AF65-F5344CB8AC3E}">
+        <p14:creationId xmlns:p14="http://schemas.microsoft.com/office/powerpoint/2010/main" val="1533643954"/>
       </p:ext>
     </p:extLst>
   </p:cSld>

</xml_diff>